<commit_message>
compliting flask web application with model
</commit_message>
<xml_diff>
--- a/Resume_Parser.pptx
+++ b/Resume_Parser.pptx
@@ -9,13 +9,14 @@
     <p:sldId id="257" r:id="rId3"/>
     <p:sldId id="269" r:id="rId4"/>
     <p:sldId id="258" r:id="rId5"/>
-    <p:sldId id="259" r:id="rId6"/>
-    <p:sldId id="263" r:id="rId7"/>
-    <p:sldId id="264" r:id="rId8"/>
-    <p:sldId id="265" r:id="rId9"/>
-    <p:sldId id="270" r:id="rId10"/>
-    <p:sldId id="261" r:id="rId11"/>
-    <p:sldId id="268" r:id="rId12"/>
+    <p:sldId id="271" r:id="rId6"/>
+    <p:sldId id="259" r:id="rId7"/>
+    <p:sldId id="263" r:id="rId8"/>
+    <p:sldId id="264" r:id="rId9"/>
+    <p:sldId id="265" r:id="rId10"/>
+    <p:sldId id="270" r:id="rId11"/>
+    <p:sldId id="261" r:id="rId12"/>
+    <p:sldId id="268" r:id="rId13"/>
   </p:sldIdLst>
   <p:sldSz cx="12192000" cy="6858000"/>
   <p:notesSz cx="6858000" cy="9144000"/>
@@ -285,7 +286,7 @@
           <a:p>
             <a:fld id="{B435050A-CE43-4698-A2C8-A7CD33575A58}" type="datetimeFigureOut">
               <a:rPr lang="en-US" smtClean="0"/>
-              <a:t>2023/12/10</a:t>
+              <a:t>2023/12/11</a:t>
             </a:fld>
             <a:endParaRPr lang="en-US"/>
           </a:p>
@@ -455,7 +456,7 @@
           <a:p>
             <a:fld id="{B435050A-CE43-4698-A2C8-A7CD33575A58}" type="datetimeFigureOut">
               <a:rPr lang="en-US" smtClean="0"/>
-              <a:t>2023/12/10</a:t>
+              <a:t>2023/12/11</a:t>
             </a:fld>
             <a:endParaRPr lang="en-US"/>
           </a:p>
@@ -635,7 +636,7 @@
           <a:p>
             <a:fld id="{B435050A-CE43-4698-A2C8-A7CD33575A58}" type="datetimeFigureOut">
               <a:rPr lang="en-US" smtClean="0"/>
-              <a:t>2023/12/10</a:t>
+              <a:t>2023/12/11</a:t>
             </a:fld>
             <a:endParaRPr lang="en-US"/>
           </a:p>
@@ -805,7 +806,7 @@
           <a:p>
             <a:fld id="{B435050A-CE43-4698-A2C8-A7CD33575A58}" type="datetimeFigureOut">
               <a:rPr lang="en-US" smtClean="0"/>
-              <a:t>2023/12/10</a:t>
+              <a:t>2023/12/11</a:t>
             </a:fld>
             <a:endParaRPr lang="en-US"/>
           </a:p>
@@ -1073,7 +1074,7 @@
           <a:p>
             <a:fld id="{B435050A-CE43-4698-A2C8-A7CD33575A58}" type="datetimeFigureOut">
               <a:rPr lang="en-US" smtClean="0"/>
-              <a:t>2023/12/10</a:t>
+              <a:t>2023/12/11</a:t>
             </a:fld>
             <a:endParaRPr lang="en-US"/>
           </a:p>
@@ -1305,7 +1306,7 @@
           <a:p>
             <a:fld id="{B435050A-CE43-4698-A2C8-A7CD33575A58}" type="datetimeFigureOut">
               <a:rPr lang="en-US" smtClean="0"/>
-              <a:t>2023/12/10</a:t>
+              <a:t>2023/12/11</a:t>
             </a:fld>
             <a:endParaRPr lang="en-US"/>
           </a:p>
@@ -1664,7 +1665,7 @@
           <a:p>
             <a:fld id="{B435050A-CE43-4698-A2C8-A7CD33575A58}" type="datetimeFigureOut">
               <a:rPr lang="en-US" smtClean="0"/>
-              <a:t>2023/12/10</a:t>
+              <a:t>2023/12/11</a:t>
             </a:fld>
             <a:endParaRPr lang="en-US"/>
           </a:p>
@@ -1805,7 +1806,7 @@
           <a:p>
             <a:fld id="{B435050A-CE43-4698-A2C8-A7CD33575A58}" type="datetimeFigureOut">
               <a:rPr lang="en-US" smtClean="0"/>
-              <a:t>2023/12/10</a:t>
+              <a:t>2023/12/11</a:t>
             </a:fld>
             <a:endParaRPr lang="en-US"/>
           </a:p>
@@ -1900,7 +1901,7 @@
           <a:p>
             <a:fld id="{B435050A-CE43-4698-A2C8-A7CD33575A58}" type="datetimeFigureOut">
               <a:rPr lang="en-US" smtClean="0"/>
-              <a:t>2023/12/10</a:t>
+              <a:t>2023/12/11</a:t>
             </a:fld>
             <a:endParaRPr lang="en-US"/>
           </a:p>
@@ -2257,7 +2258,7 @@
           <a:p>
             <a:fld id="{B435050A-CE43-4698-A2C8-A7CD33575A58}" type="datetimeFigureOut">
               <a:rPr lang="en-US" smtClean="0"/>
-              <a:t>2023/12/10</a:t>
+              <a:t>2023/12/11</a:t>
             </a:fld>
             <a:endParaRPr lang="en-US"/>
           </a:p>
@@ -2614,7 +2615,7 @@
           <a:p>
             <a:fld id="{B435050A-CE43-4698-A2C8-A7CD33575A58}" type="datetimeFigureOut">
               <a:rPr lang="en-US" smtClean="0"/>
-              <a:t>2023/12/10</a:t>
+              <a:t>2023/12/11</a:t>
             </a:fld>
             <a:endParaRPr lang="en-US"/>
           </a:p>
@@ -2855,7 +2856,7 @@
           <a:p>
             <a:fld id="{B435050A-CE43-4698-A2C8-A7CD33575A58}" type="datetimeFigureOut">
               <a:rPr lang="en-US" smtClean="0"/>
-              <a:t>2023/12/10</a:t>
+              <a:t>2023/12/11</a:t>
             </a:fld>
             <a:endParaRPr lang="en-US"/>
           </a:p>
@@ -3312,7 +3313,7 @@
           <p:cNvPr id="5" name="Title 1">
             <a:extLst>
               <a:ext uri="{FF2B5EF4-FFF2-40B4-BE49-F238E27FC236}">
-                <a16:creationId xmlns="" xmlns:a16="http://schemas.microsoft.com/office/drawing/2014/main" id="{81158390-D70D-42D4-801E-8FD4A619ABB2}"/>
+                <a16:creationId xmlns:a16="http://schemas.microsoft.com/office/drawing/2014/main" xmlns="" id="{81158390-D70D-42D4-801E-8FD4A619ABB2}"/>
               </a:ext>
             </a:extLst>
           </p:cNvPr>
@@ -3441,7 +3442,7 @@
           <p:cNvPr id="9" name="Straight Connector 8">
             <a:extLst>
               <a:ext uri="{FF2B5EF4-FFF2-40B4-BE49-F238E27FC236}">
-                <a16:creationId xmlns="" xmlns:a16="http://schemas.microsoft.com/office/drawing/2014/main" id="{66F62563-AD70-4CA8-8C31-94FF29DB6BE3}"/>
+                <a16:creationId xmlns:a16="http://schemas.microsoft.com/office/drawing/2014/main" xmlns="" id="{66F62563-AD70-4CA8-8C31-94FF29DB6BE3}"/>
               </a:ext>
             </a:extLst>
           </p:cNvPr>
@@ -3512,7 +3513,7 @@
           <p:cNvPr id="3" name="Content Placeholder 2">
             <a:extLst>
               <a:ext uri="{FF2B5EF4-FFF2-40B4-BE49-F238E27FC236}">
-                <a16:creationId xmlns="" xmlns:a16="http://schemas.microsoft.com/office/drawing/2014/main" id="{784E53BD-3B8D-4C43-BB24-F5B5DAF15598}"/>
+                <a16:creationId xmlns:a16="http://schemas.microsoft.com/office/drawing/2014/main" xmlns="" id="{ABBF52C5-55D5-4510-B050-3D276ACB6EC8}"/>
               </a:ext>
             </a:extLst>
           </p:cNvPr>
@@ -3525,8 +3526,8 @@
         </p:nvSpPr>
         <p:spPr>
           <a:xfrm>
-            <a:off x="0" y="0"/>
-            <a:ext cx="12192000" cy="6858000"/>
+            <a:off x="124178" y="292231"/>
+            <a:ext cx="12067822" cy="6565770"/>
           </a:xfrm>
         </p:spPr>
         <p:txBody>
@@ -3540,29 +3541,84 @@
             </a:pPr>
             <a:r>
               <a:rPr lang="en-US" sz="2400" b="1" dirty="0"/>
-              <a:t>Outcomes</a:t>
-            </a:r>
-          </a:p>
-          <a:p>
-            <a:pPr marL="0" indent="0">
-              <a:buNone/>
-            </a:pPr>
-            <a:endParaRPr lang="en-US" sz="2400" b="1" dirty="0"/>
-          </a:p>
-          <a:p>
-            <a:pPr marL="0" indent="0">
-              <a:buNone/>
-            </a:pPr>
-            <a:endParaRPr lang="en-US" sz="2000" dirty="0"/>
-          </a:p>
-        </p:txBody>
-      </p:sp>
-      <p:sp>
-        <p:nvSpPr>
-          <p:cNvPr id="8" name="Rectangle 7">
+              <a:t>Challenges</a:t>
+            </a:r>
+          </a:p>
+          <a:p>
+            <a:pPr marL="0" indent="0">
+              <a:buNone/>
+            </a:pPr>
+            <a:endParaRPr lang="en-US" dirty="0"/>
+          </a:p>
+          <a:p>
+            <a:pPr marL="0" indent="0">
+              <a:buNone/>
+            </a:pPr>
+            <a:r>
+              <a:rPr lang="en-US" sz="2200" dirty="0"/>
+              <a:t>While doing this project we face couples of challenges. They are given below</a:t>
+            </a:r>
+          </a:p>
+          <a:p>
+            <a:pPr marL="0" indent="0">
+              <a:buNone/>
+            </a:pPr>
+            <a:endParaRPr lang="en-US" sz="2200" dirty="0"/>
+          </a:p>
+          <a:p>
+            <a:pPr marL="342900" indent="-342900">
+              <a:buFont typeface="+mj-lt"/>
+              <a:buAutoNum type="arabicPeriod"/>
+            </a:pPr>
+            <a:r>
+              <a:rPr lang="en-US" sz="2200" dirty="0"/>
+              <a:t>Limited Resource</a:t>
+            </a:r>
+          </a:p>
+          <a:p>
+            <a:pPr marL="342900" indent="-342900">
+              <a:buFont typeface="+mj-lt"/>
+              <a:buAutoNum type="arabicPeriod"/>
+            </a:pPr>
+            <a:r>
+              <a:rPr lang="en-US" sz="2200" dirty="0" smtClean="0"/>
+              <a:t>Small Dataset</a:t>
+            </a:r>
+            <a:endParaRPr lang="en-US" sz="2200" dirty="0"/>
+          </a:p>
+          <a:p>
+            <a:pPr marL="342900" indent="-342900">
+              <a:buFont typeface="+mj-lt"/>
+              <a:buAutoNum type="arabicPeriod"/>
+            </a:pPr>
+            <a:r>
+              <a:rPr lang="en-US" sz="2200" dirty="0"/>
+              <a:t>Training </a:t>
+            </a:r>
+          </a:p>
+          <a:p>
+            <a:pPr marL="342900" indent="-342900">
+              <a:buFont typeface="+mj-lt"/>
+              <a:buAutoNum type="arabicPeriod"/>
+            </a:pPr>
+            <a:r>
+              <a:rPr lang="en-US" sz="2200" dirty="0"/>
+              <a:t>Parameter </a:t>
+            </a:r>
+            <a:r>
+              <a:rPr lang="en-US" sz="2200" dirty="0" smtClean="0"/>
+              <a:t>tuning</a:t>
+            </a:r>
+            <a:endParaRPr lang="en-US" sz="2200" dirty="0"/>
+          </a:p>
+        </p:txBody>
+      </p:sp>
+      <p:sp>
+        <p:nvSpPr>
+          <p:cNvPr id="5" name="Rectangle 4">
             <a:extLst>
               <a:ext uri="{FF2B5EF4-FFF2-40B4-BE49-F238E27FC236}">
-                <a16:creationId xmlns="" xmlns:a16="http://schemas.microsoft.com/office/drawing/2014/main" id="{F97E6783-86DE-47EA-8E1E-72D3033C099B}"/>
+                <a16:creationId xmlns:a16="http://schemas.microsoft.com/office/drawing/2014/main" xmlns="" id="{AD2D1AD9-F87D-4205-B5CB-CF0F299B465E}"/>
               </a:ext>
             </a:extLst>
           </p:cNvPr>
@@ -3571,7 +3627,7 @@
         </p:nvSpPr>
         <p:spPr>
           <a:xfrm>
-            <a:off x="231302" y="492798"/>
+            <a:off x="250156" y="803884"/>
             <a:ext cx="10165404" cy="45719"/>
           </a:xfrm>
           <a:prstGeom prst="rect">
@@ -3606,7 +3662,7 @@
     </p:spTree>
     <p:extLst>
       <p:ext uri="{BB962C8B-B14F-4D97-AF65-F5344CB8AC3E}">
-        <p14:creationId xmlns:p14="http://schemas.microsoft.com/office/powerpoint/2010/main" val="255684033"/>
+        <p14:creationId xmlns:p14="http://schemas.microsoft.com/office/powerpoint/2010/main" val="2385867789"/>
       </p:ext>
     </p:extLst>
   </p:cSld>
@@ -3638,7 +3694,133 @@
           <p:cNvPr id="3" name="Content Placeholder 2">
             <a:extLst>
               <a:ext uri="{FF2B5EF4-FFF2-40B4-BE49-F238E27FC236}">
-                <a16:creationId xmlns="" xmlns:a16="http://schemas.microsoft.com/office/drawing/2014/main" id="{784E53BD-3B8D-4C43-BB24-F5B5DAF15598}"/>
+                <a16:creationId xmlns:a16="http://schemas.microsoft.com/office/drawing/2014/main" xmlns="" id="{784E53BD-3B8D-4C43-BB24-F5B5DAF15598}"/>
+              </a:ext>
+            </a:extLst>
+          </p:cNvPr>
+          <p:cNvSpPr>
+            <a:spLocks noGrp="1"/>
+          </p:cNvSpPr>
+          <p:nvPr>
+            <p:ph idx="1"/>
+          </p:nvPr>
+        </p:nvSpPr>
+        <p:spPr>
+          <a:xfrm>
+            <a:off x="0" y="0"/>
+            <a:ext cx="12192000" cy="6858000"/>
+          </a:xfrm>
+        </p:spPr>
+        <p:txBody>
+          <a:bodyPr>
+            <a:normAutofit/>
+          </a:bodyPr>
+          <a:lstStyle/>
+          <a:p>
+            <a:pPr marL="0" indent="0">
+              <a:buNone/>
+            </a:pPr>
+            <a:r>
+              <a:rPr lang="en-US" sz="2400" b="1" dirty="0"/>
+              <a:t>Outcomes</a:t>
+            </a:r>
+          </a:p>
+          <a:p>
+            <a:pPr marL="0" indent="0">
+              <a:buNone/>
+            </a:pPr>
+            <a:endParaRPr lang="en-US" sz="2400" b="1" dirty="0"/>
+          </a:p>
+          <a:p>
+            <a:pPr marL="0" indent="0">
+              <a:buNone/>
+            </a:pPr>
+            <a:endParaRPr lang="en-US" sz="2000" dirty="0"/>
+          </a:p>
+        </p:txBody>
+      </p:sp>
+      <p:sp>
+        <p:nvSpPr>
+          <p:cNvPr id="8" name="Rectangle 7">
+            <a:extLst>
+              <a:ext uri="{FF2B5EF4-FFF2-40B4-BE49-F238E27FC236}">
+                <a16:creationId xmlns:a16="http://schemas.microsoft.com/office/drawing/2014/main" xmlns="" id="{F97E6783-86DE-47EA-8E1E-72D3033C099B}"/>
+              </a:ext>
+            </a:extLst>
+          </p:cNvPr>
+          <p:cNvSpPr/>
+          <p:nvPr/>
+        </p:nvSpPr>
+        <p:spPr>
+          <a:xfrm>
+            <a:off x="231302" y="492798"/>
+            <a:ext cx="10165404" cy="45719"/>
+          </a:xfrm>
+          <a:prstGeom prst="rect">
+            <a:avLst/>
+          </a:prstGeom>
+        </p:spPr>
+        <p:style>
+          <a:lnRef idx="2">
+            <a:schemeClr val="accent1">
+              <a:shade val="50000"/>
+            </a:schemeClr>
+          </a:lnRef>
+          <a:fillRef idx="1">
+            <a:schemeClr val="accent1"/>
+          </a:fillRef>
+          <a:effectRef idx="0">
+            <a:schemeClr val="accent1"/>
+          </a:effectRef>
+          <a:fontRef idx="minor">
+            <a:schemeClr val="lt1"/>
+          </a:fontRef>
+        </p:style>
+        <p:txBody>
+          <a:bodyPr rtlCol="0" anchor="ctr"/>
+          <a:lstStyle/>
+          <a:p>
+            <a:pPr algn="ctr"/>
+            <a:endParaRPr lang="en-US"/>
+          </a:p>
+        </p:txBody>
+      </p:sp>
+    </p:spTree>
+    <p:extLst>
+      <p:ext uri="{BB962C8B-B14F-4D97-AF65-F5344CB8AC3E}">
+        <p14:creationId xmlns:p14="http://schemas.microsoft.com/office/powerpoint/2010/main" val="255684033"/>
+      </p:ext>
+    </p:extLst>
+  </p:cSld>
+  <p:clrMapOvr>
+    <a:masterClrMapping/>
+  </p:clrMapOvr>
+</p:sld>
+</file>
+
+<file path=ppt/slides/slide12.xml><?xml version="1.0" encoding="utf-8"?>
+<p:sld xmlns:a="http://schemas.openxmlformats.org/drawingml/2006/main" xmlns:r="http://schemas.openxmlformats.org/officeDocument/2006/relationships" xmlns:p="http://schemas.openxmlformats.org/presentationml/2006/main">
+  <p:cSld>
+    <p:spTree>
+      <p:nvGrpSpPr>
+        <p:cNvPr id="1" name=""/>
+        <p:cNvGrpSpPr/>
+        <p:nvPr/>
+      </p:nvGrpSpPr>
+      <p:grpSpPr>
+        <a:xfrm>
+          <a:off x="0" y="0"/>
+          <a:ext cx="0" cy="0"/>
+          <a:chOff x="0" y="0"/>
+          <a:chExt cx="0" cy="0"/>
+        </a:xfrm>
+      </p:grpSpPr>
+      <p:sp>
+        <p:nvSpPr>
+          <p:cNvPr id="3" name="Content Placeholder 2">
+            <a:extLst>
+              <a:ext uri="{FF2B5EF4-FFF2-40B4-BE49-F238E27FC236}">
+                <a16:creationId xmlns:a16="http://schemas.microsoft.com/office/drawing/2014/main" xmlns="" id="{784E53BD-3B8D-4C43-BB24-F5B5DAF15598}"/>
               </a:ext>
             </a:extLst>
           </p:cNvPr>
@@ -3770,7 +3952,7 @@
           <p:cNvPr id="5" name="Content Placeholder 4">
             <a:extLst>
               <a:ext uri="{FF2B5EF4-FFF2-40B4-BE49-F238E27FC236}">
-                <a16:creationId xmlns="" xmlns:a16="http://schemas.microsoft.com/office/drawing/2014/main" id="{945CDB7E-789B-4E53-B881-D46A0EC861CB}"/>
+                <a16:creationId xmlns:a16="http://schemas.microsoft.com/office/drawing/2014/main" xmlns="" id="{945CDB7E-789B-4E53-B881-D46A0EC861CB}"/>
               </a:ext>
             </a:extLst>
           </p:cNvPr>
@@ -3880,7 +4062,7 @@
           <p:cNvPr id="11" name="Rectangle 10">
             <a:extLst>
               <a:ext uri="{FF2B5EF4-FFF2-40B4-BE49-F238E27FC236}">
-                <a16:creationId xmlns="" xmlns:a16="http://schemas.microsoft.com/office/drawing/2014/main" id="{C7FB0B34-90CC-41E5-A7C0-D51D2895B017}"/>
+                <a16:creationId xmlns:a16="http://schemas.microsoft.com/office/drawing/2014/main" xmlns="" id="{C7FB0B34-90CC-41E5-A7C0-D51D2895B017}"/>
               </a:ext>
             </a:extLst>
           </p:cNvPr>
@@ -3980,7 +4162,7 @@
           <p:cNvPr id="5" name="Content Placeholder 4">
             <a:extLst>
               <a:ext uri="{FF2B5EF4-FFF2-40B4-BE49-F238E27FC236}">
-                <a16:creationId xmlns="" xmlns:a16="http://schemas.microsoft.com/office/drawing/2014/main" id="{945CDB7E-789B-4E53-B881-D46A0EC861CB}"/>
+                <a16:creationId xmlns:a16="http://schemas.microsoft.com/office/drawing/2014/main" xmlns="" id="{945CDB7E-789B-4E53-B881-D46A0EC861CB}"/>
               </a:ext>
             </a:extLst>
           </p:cNvPr>
@@ -4051,15 +4233,7 @@
                 <a:ea typeface="Calibri" panose="020F0502020204030204" pitchFamily="34" charset="0"/>
                 <a:cs typeface="Calibri" panose="020F0502020204030204" pitchFamily="34" charset="0"/>
               </a:rPr>
-              <a:t>KNN and OnevsRest </a:t>
-            </a:r>
-            <a:r>
-              <a:rPr lang="en-US" sz="2400" dirty="0" smtClean="0">
-                <a:latin typeface="Calibri" panose="020F0502020204030204" pitchFamily="34" charset="0"/>
-                <a:ea typeface="Calibri" panose="020F0502020204030204" pitchFamily="34" charset="0"/>
-                <a:cs typeface="Calibri" panose="020F0502020204030204" pitchFamily="34" charset="0"/>
-              </a:rPr>
-              <a:t>model</a:t>
+              <a:t>KNN and OnevsRest model</a:t>
             </a:r>
             <a:r>
               <a:rPr lang="en-US" sz="2400" dirty="0">
@@ -4148,23 +4322,7 @@
                 <a:ea typeface="Calibri" panose="020F0502020204030204" pitchFamily="34" charset="0"/>
                 <a:cs typeface="Calibri" panose="020F0502020204030204" pitchFamily="34" charset="0"/>
               </a:rPr>
-              <a:t>resume file like pdf, txt </a:t>
-            </a:r>
-            <a:r>
-              <a:rPr lang="en-US" sz="2400" dirty="0" smtClean="0">
-                <a:latin typeface="Calibri" panose="020F0502020204030204" pitchFamily="34" charset="0"/>
-                <a:ea typeface="Calibri" panose="020F0502020204030204" pitchFamily="34" charset="0"/>
-                <a:cs typeface="Calibri" panose="020F0502020204030204" pitchFamily="34" charset="0"/>
-              </a:rPr>
-              <a:t>and docks </a:t>
-            </a:r>
-            <a:r>
-              <a:rPr lang="en-US" sz="2400" dirty="0" smtClean="0">
-                <a:latin typeface="Calibri" panose="020F0502020204030204" pitchFamily="34" charset="0"/>
-                <a:ea typeface="Calibri" panose="020F0502020204030204" pitchFamily="34" charset="0"/>
-                <a:cs typeface="Calibri" panose="020F0502020204030204" pitchFamily="34" charset="0"/>
-              </a:rPr>
-              <a:t>to </a:t>
+              <a:t>resume file like pdf, txt and docks to </a:t>
             </a:r>
             <a:r>
               <a:rPr lang="en-US" sz="2400" dirty="0">
@@ -4277,7 +4435,7 @@
           <p:cNvPr id="11" name="Rectangle 10">
             <a:extLst>
               <a:ext uri="{FF2B5EF4-FFF2-40B4-BE49-F238E27FC236}">
-                <a16:creationId xmlns="" xmlns:a16="http://schemas.microsoft.com/office/drawing/2014/main" id="{C7FB0B34-90CC-41E5-A7C0-D51D2895B017}"/>
+                <a16:creationId xmlns:a16="http://schemas.microsoft.com/office/drawing/2014/main" xmlns="" id="{C7FB0B34-90CC-41E5-A7C0-D51D2895B017}"/>
               </a:ext>
             </a:extLst>
           </p:cNvPr>
@@ -4353,7 +4511,7 @@
           <p:cNvPr id="3" name="Content Placeholder 2">
             <a:extLst>
               <a:ext uri="{FF2B5EF4-FFF2-40B4-BE49-F238E27FC236}">
-                <a16:creationId xmlns="" xmlns:a16="http://schemas.microsoft.com/office/drawing/2014/main" id="{8FC8D4DE-391B-4AAD-BCD0-B4FEA76A93A3}"/>
+                <a16:creationId xmlns:a16="http://schemas.microsoft.com/office/drawing/2014/main" xmlns="" id="{8FC8D4DE-391B-4AAD-BCD0-B4FEA76A93A3}"/>
               </a:ext>
             </a:extLst>
           </p:cNvPr>
@@ -4398,11 +4556,7 @@
             </a:r>
             <a:r>
               <a:rPr lang="en-US" sz="2400" dirty="0" smtClean="0"/>
-              <a:t>Resume</a:t>
-            </a:r>
-            <a:r>
-              <a:rPr lang="en-US" sz="2400" dirty="0" smtClean="0"/>
-              <a:t> </a:t>
+              <a:t>Resume </a:t>
             </a:r>
             <a:r>
               <a:rPr lang="en-US" sz="2400" dirty="0"/>
@@ -4469,7 +4623,7 @@
           <p:cNvPr id="8" name="Rectangle 7">
             <a:extLst>
               <a:ext uri="{FF2B5EF4-FFF2-40B4-BE49-F238E27FC236}">
-                <a16:creationId xmlns="" xmlns:a16="http://schemas.microsoft.com/office/drawing/2014/main" id="{B9A1C065-E0B8-491B-BEA3-7F50B5374A92}"/>
+                <a16:creationId xmlns:a16="http://schemas.microsoft.com/office/drawing/2014/main" xmlns="" id="{B9A1C065-E0B8-491B-BEA3-7F50B5374A92}"/>
               </a:ext>
             </a:extLst>
           </p:cNvPr>
@@ -4545,7 +4699,7 @@
           <p:cNvPr id="3" name="Content Placeholder 2">
             <a:extLst>
               <a:ext uri="{FF2B5EF4-FFF2-40B4-BE49-F238E27FC236}">
-                <a16:creationId xmlns="" xmlns:a16="http://schemas.microsoft.com/office/drawing/2014/main" id="{ABBF52C5-55D5-4510-B050-3D276ACB6EC8}"/>
+                <a16:creationId xmlns:a16="http://schemas.microsoft.com/office/drawing/2014/main" xmlns="" id="{8FC8D4DE-391B-4AAD-BCD0-B4FEA76A93A3}"/>
               </a:ext>
             </a:extLst>
           </p:cNvPr>
@@ -4558,14 +4712,12 @@
         </p:nvSpPr>
         <p:spPr>
           <a:xfrm>
-            <a:off x="124178" y="1"/>
-            <a:ext cx="12067822" cy="6858000"/>
+            <a:off x="169333" y="169334"/>
+            <a:ext cx="11875911" cy="6570134"/>
           </a:xfrm>
         </p:spPr>
         <p:txBody>
-          <a:bodyPr>
-            <a:normAutofit/>
-          </a:bodyPr>
+          <a:bodyPr/>
           <a:lstStyle/>
           <a:p>
             <a:pPr marL="0" indent="0">
@@ -4573,8 +4725,26 @@
             </a:pPr>
             <a:r>
               <a:rPr lang="en-US" sz="2400" b="1" dirty="0"/>
-              <a:t>Possible Approaches</a:t>
-            </a:r>
+              <a:t>Dataset</a:t>
+            </a:r>
+          </a:p>
+          <a:p>
+            <a:pPr marL="0" indent="0">
+              <a:buNone/>
+            </a:pPr>
+            <a:endParaRPr lang="en-US" sz="2400" dirty="0"/>
+          </a:p>
+          <a:p>
+            <a:pPr marL="0" indent="0">
+              <a:buNone/>
+            </a:pPr>
+            <a:endParaRPr lang="en-US" sz="2400" dirty="0"/>
+          </a:p>
+          <a:p>
+            <a:pPr marL="0" indent="0">
+              <a:buNone/>
+            </a:pPr>
+            <a:endParaRPr lang="en-US" sz="2400" dirty="0"/>
           </a:p>
           <a:p>
             <a:pPr marL="0" indent="0">
@@ -4582,110 +4752,14 @@
             </a:pPr>
             <a:endParaRPr lang="en-US" dirty="0"/>
           </a:p>
-          <a:p>
-            <a:pPr marL="0" indent="0">
-              <a:buNone/>
-            </a:pPr>
-            <a:r>
-              <a:rPr lang="en-US" sz="2200" dirty="0"/>
-              <a:t>To address this problem, we are going with a supervised learning approach. </a:t>
-            </a:r>
-            <a:endParaRPr lang="en-US" sz="2200" dirty="0" smtClean="0"/>
-          </a:p>
-          <a:p>
-            <a:pPr marL="0" indent="0">
-              <a:buNone/>
-            </a:pPr>
-            <a:endParaRPr lang="en-US" sz="2200" dirty="0"/>
-          </a:p>
-          <a:p>
-            <a:pPr marL="0" indent="0">
-              <a:buNone/>
-            </a:pPr>
-            <a:r>
-              <a:rPr lang="en-US" sz="2200" dirty="0"/>
-              <a:t>We are going through the following steps to solve this problem </a:t>
-            </a:r>
-          </a:p>
-          <a:p>
-            <a:pPr marL="342900" indent="-342900">
-              <a:buFont typeface="+mj-lt"/>
-              <a:buAutoNum type="arabicPeriod"/>
-            </a:pPr>
-            <a:r>
-              <a:rPr lang="en-US" sz="2200" dirty="0"/>
-              <a:t>Problem Formulation and Business Goal </a:t>
-            </a:r>
-          </a:p>
-          <a:p>
-            <a:pPr marL="342900" indent="-342900">
-              <a:buFont typeface="+mj-lt"/>
-              <a:buAutoNum type="arabicPeriod"/>
-            </a:pPr>
-            <a:r>
-              <a:rPr lang="en-US" sz="2200" dirty="0"/>
-              <a:t>Data Collection </a:t>
-            </a:r>
-          </a:p>
-          <a:p>
-            <a:pPr marL="342900" indent="-342900">
-              <a:buFont typeface="+mj-lt"/>
-              <a:buAutoNum type="arabicPeriod"/>
-            </a:pPr>
-            <a:r>
-              <a:rPr lang="en-US" sz="2200" dirty="0"/>
-              <a:t>EDA and Data Preprocessing </a:t>
-            </a:r>
-          </a:p>
-          <a:p>
-            <a:pPr marL="342900" indent="-342900">
-              <a:buFont typeface="+mj-lt"/>
-              <a:buAutoNum type="arabicPeriod"/>
-            </a:pPr>
-            <a:r>
-              <a:rPr lang="en-US" sz="2200" dirty="0"/>
-              <a:t>Model Building and Performance Evaluation</a:t>
-            </a:r>
-          </a:p>
-          <a:p>
-            <a:pPr marL="342900" indent="-342900">
-              <a:buFont typeface="+mj-lt"/>
-              <a:buAutoNum type="arabicPeriod"/>
-            </a:pPr>
-            <a:r>
-              <a:rPr lang="en-US" sz="2200" dirty="0"/>
-              <a:t>Model tuning and </a:t>
-            </a:r>
-          </a:p>
-          <a:p>
-            <a:pPr marL="342900" indent="-342900">
-              <a:buFont typeface="+mj-lt"/>
-              <a:buAutoNum type="arabicPeriod"/>
-            </a:pPr>
-            <a:r>
-              <a:rPr lang="en-US" sz="2200" dirty="0"/>
-              <a:t>Draw Conclusion</a:t>
-            </a:r>
-          </a:p>
-          <a:p>
-            <a:pPr marL="342900" indent="-342900">
-              <a:buFont typeface="+mj-lt"/>
-              <a:buAutoNum type="arabicPeriod"/>
-            </a:pPr>
-            <a:r>
-              <a:rPr lang="en-US" sz="2200" dirty="0"/>
-              <a:t>Flask Web Application</a:t>
-            </a:r>
-            <a:endParaRPr lang="en-US" dirty="0"/>
-          </a:p>
-        </p:txBody>
-      </p:sp>
-      <p:sp>
-        <p:nvSpPr>
-          <p:cNvPr id="5" name="Rectangle 4">
+        </p:txBody>
+      </p:sp>
+      <p:sp>
+        <p:nvSpPr>
+          <p:cNvPr id="8" name="Rectangle 7">
             <a:extLst>
               <a:ext uri="{FF2B5EF4-FFF2-40B4-BE49-F238E27FC236}">
-                <a16:creationId xmlns="" xmlns:a16="http://schemas.microsoft.com/office/drawing/2014/main" id="{AD2D1AD9-F87D-4205-B5CB-CF0F299B465E}"/>
+                <a16:creationId xmlns:a16="http://schemas.microsoft.com/office/drawing/2014/main" xmlns="" id="{B9A1C065-E0B8-491B-BEA3-7F50B5374A92}"/>
               </a:ext>
             </a:extLst>
           </p:cNvPr>
@@ -4694,7 +4768,7 @@
         </p:nvSpPr>
         <p:spPr>
           <a:xfrm>
-            <a:off x="250156" y="417382"/>
+            <a:off x="306601" y="584738"/>
             <a:ext cx="10165404" cy="45719"/>
           </a:xfrm>
           <a:prstGeom prst="rect">
@@ -4726,10 +4800,34 @@
           </a:p>
         </p:txBody>
       </p:sp>
+      <p:pic>
+        <p:nvPicPr>
+          <p:cNvPr id="2" name="Picture 1"/>
+          <p:cNvPicPr>
+            <a:picLocks noChangeAspect="1"/>
+          </p:cNvPicPr>
+          <p:nvPr/>
+        </p:nvPicPr>
+        <p:blipFill>
+          <a:blip r:embed="rId2"/>
+          <a:stretch>
+            <a:fillRect/>
+          </a:stretch>
+        </p:blipFill>
+        <p:spPr>
+          <a:xfrm>
+            <a:off x="169333" y="1319679"/>
+            <a:ext cx="11670792" cy="4730566"/>
+          </a:xfrm>
+          <a:prstGeom prst="rect">
+            <a:avLst/>
+          </a:prstGeom>
+        </p:spPr>
+      </p:pic>
     </p:spTree>
     <p:extLst>
       <p:ext uri="{BB962C8B-B14F-4D97-AF65-F5344CB8AC3E}">
-        <p14:creationId xmlns:p14="http://schemas.microsoft.com/office/powerpoint/2010/main" val="1599801722"/>
+        <p14:creationId xmlns:p14="http://schemas.microsoft.com/office/powerpoint/2010/main" val="515483089"/>
       </p:ext>
     </p:extLst>
   </p:cSld>
@@ -4761,7 +4859,7 @@
           <p:cNvPr id="3" name="Content Placeholder 2">
             <a:extLst>
               <a:ext uri="{FF2B5EF4-FFF2-40B4-BE49-F238E27FC236}">
-                <a16:creationId xmlns="" xmlns:a16="http://schemas.microsoft.com/office/drawing/2014/main" id="{36032309-7953-4411-A6CB-82261C6BE71A}"/>
+                <a16:creationId xmlns:a16="http://schemas.microsoft.com/office/drawing/2014/main" xmlns="" id="{ABBF52C5-55D5-4510-B050-3D276ACB6EC8}"/>
               </a:ext>
             </a:extLst>
           </p:cNvPr>
@@ -4774,8 +4872,8 @@
         </p:nvSpPr>
         <p:spPr>
           <a:xfrm>
-            <a:off x="207391" y="169682"/>
-            <a:ext cx="11802358" cy="6561056"/>
+            <a:off x="124178" y="1"/>
+            <a:ext cx="12067822" cy="6858000"/>
           </a:xfrm>
         </p:spPr>
         <p:txBody>
@@ -4789,23 +4887,119 @@
             </a:pPr>
             <a:r>
               <a:rPr lang="en-US" sz="2400" b="1" dirty="0"/>
-              <a:t>Model Building</a:t>
-            </a:r>
-          </a:p>
-          <a:p>
-            <a:pPr marL="0" indent="0">
-              <a:buNone/>
-            </a:pPr>
-            <a:endParaRPr lang="en-US" sz="2400" b="1" dirty="0"/>
-          </a:p>
-        </p:txBody>
-      </p:sp>
-      <p:sp>
-        <p:nvSpPr>
-          <p:cNvPr id="4" name="Rectangle 3">
+              <a:t>Possible Approaches</a:t>
+            </a:r>
+          </a:p>
+          <a:p>
+            <a:pPr marL="0" indent="0">
+              <a:buNone/>
+            </a:pPr>
+            <a:endParaRPr lang="en-US" dirty="0"/>
+          </a:p>
+          <a:p>
+            <a:pPr marL="0" indent="0">
+              <a:buNone/>
+            </a:pPr>
+            <a:r>
+              <a:rPr lang="en-US" sz="2200" dirty="0"/>
+              <a:t>To address this problem, we are going with a supervised learning approach. </a:t>
+            </a:r>
+            <a:endParaRPr lang="en-US" sz="2200" dirty="0" smtClean="0"/>
+          </a:p>
+          <a:p>
+            <a:pPr marL="0" indent="0">
+              <a:buNone/>
+            </a:pPr>
+            <a:endParaRPr lang="en-US" sz="2200" dirty="0"/>
+          </a:p>
+          <a:p>
+            <a:pPr marL="0" indent="0">
+              <a:buNone/>
+            </a:pPr>
+            <a:r>
+              <a:rPr lang="en-US" sz="2200" dirty="0"/>
+              <a:t>We are going through the following steps to solve this problem </a:t>
+            </a:r>
+          </a:p>
+          <a:p>
+            <a:pPr marL="342900" indent="-342900">
+              <a:buFont typeface="+mj-lt"/>
+              <a:buAutoNum type="arabicPeriod"/>
+            </a:pPr>
+            <a:r>
+              <a:rPr lang="en-US" sz="2200" dirty="0"/>
+              <a:t>Problem Formulation and Business Goal </a:t>
+            </a:r>
+          </a:p>
+          <a:p>
+            <a:pPr marL="342900" indent="-342900">
+              <a:buFont typeface="+mj-lt"/>
+              <a:buAutoNum type="arabicPeriod"/>
+            </a:pPr>
+            <a:r>
+              <a:rPr lang="en-US" sz="2200" dirty="0"/>
+              <a:t>Data Collection </a:t>
+            </a:r>
+          </a:p>
+          <a:p>
+            <a:pPr marL="342900" indent="-342900">
+              <a:buFont typeface="+mj-lt"/>
+              <a:buAutoNum type="arabicPeriod"/>
+            </a:pPr>
+            <a:r>
+              <a:rPr lang="en-US" sz="2200" dirty="0"/>
+              <a:t>EDA and Data Preprocessing </a:t>
+            </a:r>
+          </a:p>
+          <a:p>
+            <a:pPr marL="342900" indent="-342900">
+              <a:buFont typeface="+mj-lt"/>
+              <a:buAutoNum type="arabicPeriod"/>
+            </a:pPr>
+            <a:r>
+              <a:rPr lang="en-US" sz="2200" dirty="0"/>
+              <a:t>Model Building and Performance Evaluation</a:t>
+            </a:r>
+          </a:p>
+          <a:p>
+            <a:pPr marL="342900" indent="-342900">
+              <a:buFont typeface="+mj-lt"/>
+              <a:buAutoNum type="arabicPeriod"/>
+            </a:pPr>
+            <a:r>
+              <a:rPr lang="en-US" sz="2200" dirty="0"/>
+              <a:t>Model tuning and </a:t>
+            </a:r>
+          </a:p>
+          <a:p>
+            <a:pPr marL="342900" indent="-342900">
+              <a:buFont typeface="+mj-lt"/>
+              <a:buAutoNum type="arabicPeriod"/>
+            </a:pPr>
+            <a:r>
+              <a:rPr lang="en-US" sz="2200" dirty="0"/>
+              <a:t>Draw Conclusion</a:t>
+            </a:r>
+          </a:p>
+          <a:p>
+            <a:pPr marL="342900" indent="-342900">
+              <a:buFont typeface="+mj-lt"/>
+              <a:buAutoNum type="arabicPeriod"/>
+            </a:pPr>
+            <a:r>
+              <a:rPr lang="en-US" sz="2200" dirty="0"/>
+              <a:t>Flask Web Application</a:t>
+            </a:r>
+            <a:endParaRPr lang="en-US" dirty="0"/>
+          </a:p>
+        </p:txBody>
+      </p:sp>
+      <p:sp>
+        <p:nvSpPr>
+          <p:cNvPr id="5" name="Rectangle 4">
             <a:extLst>
               <a:ext uri="{FF2B5EF4-FFF2-40B4-BE49-F238E27FC236}">
-                <a16:creationId xmlns="" xmlns:a16="http://schemas.microsoft.com/office/drawing/2014/main" id="{E501E344-C726-4904-A96C-4ABD2A3BD030}"/>
+                <a16:creationId xmlns:a16="http://schemas.microsoft.com/office/drawing/2014/main" xmlns="" id="{AD2D1AD9-F87D-4205-B5CB-CF0F299B465E}"/>
               </a:ext>
             </a:extLst>
           </p:cNvPr>
@@ -4814,7 +5008,7 @@
         </p:nvSpPr>
         <p:spPr>
           <a:xfrm>
-            <a:off x="250156" y="634202"/>
+            <a:off x="250156" y="417382"/>
             <a:ext cx="10165404" cy="45719"/>
           </a:xfrm>
           <a:prstGeom prst="rect">
@@ -4849,7 +5043,7 @@
     </p:spTree>
     <p:extLst>
       <p:ext uri="{BB962C8B-B14F-4D97-AF65-F5344CB8AC3E}">
-        <p14:creationId xmlns:p14="http://schemas.microsoft.com/office/powerpoint/2010/main" val="1147818748"/>
+        <p14:creationId xmlns:p14="http://schemas.microsoft.com/office/powerpoint/2010/main" val="1599801722"/>
       </p:ext>
     </p:extLst>
   </p:cSld>
@@ -4881,7 +5075,7 @@
           <p:cNvPr id="3" name="Content Placeholder 2">
             <a:extLst>
               <a:ext uri="{FF2B5EF4-FFF2-40B4-BE49-F238E27FC236}">
-                <a16:creationId xmlns="" xmlns:a16="http://schemas.microsoft.com/office/drawing/2014/main" id="{CAB67325-8C03-4DBA-ADB5-B1A82116F775}"/>
+                <a16:creationId xmlns:a16="http://schemas.microsoft.com/office/drawing/2014/main" xmlns="" id="{36032309-7953-4411-A6CB-82261C6BE71A}"/>
               </a:ext>
             </a:extLst>
           </p:cNvPr>
@@ -4894,8 +5088,8 @@
         </p:nvSpPr>
         <p:spPr>
           <a:xfrm>
-            <a:off x="113122" y="84841"/>
-            <a:ext cx="11915480" cy="6655323"/>
+            <a:off x="207391" y="169682"/>
+            <a:ext cx="11802358" cy="6561056"/>
           </a:xfrm>
         </p:spPr>
         <p:txBody>
@@ -4909,29 +5103,23 @@
             </a:pPr>
             <a:r>
               <a:rPr lang="en-US" sz="2400" b="1" dirty="0"/>
-              <a:t>2 Models for 2 Prediction</a:t>
-            </a:r>
-          </a:p>
-          <a:p>
-            <a:pPr marL="0" indent="0">
-              <a:buNone/>
-            </a:pPr>
-            <a:endParaRPr lang="en-US" sz="1600" dirty="0"/>
-          </a:p>
-          <a:p>
-            <a:pPr marL="0" indent="0">
-              <a:buNone/>
-            </a:pPr>
-            <a:endParaRPr lang="en-US" sz="2400" dirty="0"/>
-          </a:p>
-        </p:txBody>
-      </p:sp>
-      <p:sp>
-        <p:nvSpPr>
-          <p:cNvPr id="5" name="Rectangle 4">
+              <a:t>Model Building</a:t>
+            </a:r>
+          </a:p>
+          <a:p>
+            <a:pPr marL="0" indent="0">
+              <a:buNone/>
+            </a:pPr>
+            <a:endParaRPr lang="en-US" sz="2400" b="1" dirty="0"/>
+          </a:p>
+        </p:txBody>
+      </p:sp>
+      <p:sp>
+        <p:nvSpPr>
+          <p:cNvPr id="4" name="Rectangle 3">
             <a:extLst>
               <a:ext uri="{FF2B5EF4-FFF2-40B4-BE49-F238E27FC236}">
-                <a16:creationId xmlns="" xmlns:a16="http://schemas.microsoft.com/office/drawing/2014/main" id="{2717FFB2-90EC-4769-8CC9-5B7A83455949}"/>
+                <a16:creationId xmlns:a16="http://schemas.microsoft.com/office/drawing/2014/main" xmlns="" id="{E501E344-C726-4904-A96C-4ABD2A3BD030}"/>
               </a:ext>
             </a:extLst>
           </p:cNvPr>
@@ -4940,7 +5128,7 @@
         </p:nvSpPr>
         <p:spPr>
           <a:xfrm>
-            <a:off x="250156" y="530506"/>
+            <a:off x="250156" y="634202"/>
             <a:ext cx="10165404" cy="45719"/>
           </a:xfrm>
           <a:prstGeom prst="rect">
@@ -4975,7 +5163,7 @@
     </p:spTree>
     <p:extLst>
       <p:ext uri="{BB962C8B-B14F-4D97-AF65-F5344CB8AC3E}">
-        <p14:creationId xmlns:p14="http://schemas.microsoft.com/office/powerpoint/2010/main" val="1390675152"/>
+        <p14:creationId xmlns:p14="http://schemas.microsoft.com/office/powerpoint/2010/main" val="1147818748"/>
       </p:ext>
     </p:extLst>
   </p:cSld>
@@ -5007,7 +5195,7 @@
           <p:cNvPr id="3" name="Content Placeholder 2">
             <a:extLst>
               <a:ext uri="{FF2B5EF4-FFF2-40B4-BE49-F238E27FC236}">
-                <a16:creationId xmlns="" xmlns:a16="http://schemas.microsoft.com/office/drawing/2014/main" id="{6AB50E12-B186-43F7-BCAD-7B999F82AD6A}"/>
+                <a16:creationId xmlns:a16="http://schemas.microsoft.com/office/drawing/2014/main" xmlns="" id="{CAB67325-8C03-4DBA-ADB5-B1A82116F775}"/>
               </a:ext>
             </a:extLst>
           </p:cNvPr>
@@ -5020,8 +5208,8 @@
         </p:nvSpPr>
         <p:spPr>
           <a:xfrm>
-            <a:off x="94268" y="122548"/>
-            <a:ext cx="12028602" cy="6655324"/>
+            <a:off x="113122" y="84841"/>
+            <a:ext cx="11915480" cy="6655323"/>
           </a:xfrm>
         </p:spPr>
         <p:txBody>
@@ -5035,71 +5223,29 @@
             </a:pPr>
             <a:r>
               <a:rPr lang="en-US" sz="2400" b="1" dirty="0"/>
-              <a:t>Architecture For First Approach</a:t>
-            </a:r>
-          </a:p>
-          <a:p>
-            <a:pPr marL="0" indent="0">
-              <a:buNone/>
-            </a:pPr>
-            <a:endParaRPr lang="en-US" sz="2400" b="1" dirty="0"/>
-          </a:p>
-          <a:p>
-            <a:pPr marL="0" indent="0">
-              <a:buNone/>
-            </a:pPr>
-            <a:endParaRPr lang="en-US" sz="2400" b="1" dirty="0"/>
-          </a:p>
-          <a:p>
-            <a:pPr marL="0" indent="0">
-              <a:buNone/>
-            </a:pPr>
-            <a:endParaRPr lang="en-US" sz="2400" b="1" dirty="0"/>
-          </a:p>
-          <a:p>
-            <a:pPr marL="0" indent="0">
-              <a:buNone/>
-            </a:pPr>
-            <a:endParaRPr lang="en-US" sz="2400" b="1" dirty="0"/>
-          </a:p>
-          <a:p>
-            <a:pPr marL="0" indent="0">
-              <a:buNone/>
-            </a:pPr>
-            <a:endParaRPr lang="en-US" sz="2400" b="1" dirty="0"/>
-          </a:p>
-          <a:p>
-            <a:pPr marL="0" indent="0">
-              <a:buNone/>
-            </a:pPr>
-            <a:endParaRPr lang="en-US" sz="2400" b="1" dirty="0"/>
-          </a:p>
-          <a:p>
-            <a:pPr marL="0" indent="0">
-              <a:buNone/>
-            </a:pPr>
-            <a:endParaRPr lang="en-US" sz="2400" b="1" dirty="0"/>
-          </a:p>
-          <a:p>
-            <a:pPr marL="0" indent="0">
-              <a:buNone/>
-            </a:pPr>
-            <a:endParaRPr lang="en-US" sz="2400" b="1" dirty="0"/>
-          </a:p>
-          <a:p>
-            <a:pPr marL="0" indent="0">
-              <a:buNone/>
-            </a:pPr>
-            <a:endParaRPr lang="en-US" sz="2400" b="1" dirty="0"/>
-          </a:p>
-        </p:txBody>
-      </p:sp>
-      <p:sp>
-        <p:nvSpPr>
-          <p:cNvPr id="7" name="Rectangle 6">
+              <a:t>2 Models for 2 Prediction</a:t>
+            </a:r>
+          </a:p>
+          <a:p>
+            <a:pPr marL="0" indent="0">
+              <a:buNone/>
+            </a:pPr>
+            <a:endParaRPr lang="en-US" sz="1600" dirty="0"/>
+          </a:p>
+          <a:p>
+            <a:pPr marL="0" indent="0">
+              <a:buNone/>
+            </a:pPr>
+            <a:endParaRPr lang="en-US" sz="2400" dirty="0"/>
+          </a:p>
+        </p:txBody>
+      </p:sp>
+      <p:sp>
+        <p:nvSpPr>
+          <p:cNvPr id="5" name="Rectangle 4">
             <a:extLst>
               <a:ext uri="{FF2B5EF4-FFF2-40B4-BE49-F238E27FC236}">
-                <a16:creationId xmlns="" xmlns:a16="http://schemas.microsoft.com/office/drawing/2014/main" id="{63B223F2-E837-47E3-9990-86AD3D9C86ED}"/>
+                <a16:creationId xmlns:a16="http://schemas.microsoft.com/office/drawing/2014/main" xmlns="" id="{2717FFB2-90EC-4769-8CC9-5B7A83455949}"/>
               </a:ext>
             </a:extLst>
           </p:cNvPr>
@@ -5108,7 +5254,7 @@
         </p:nvSpPr>
         <p:spPr>
           <a:xfrm>
-            <a:off x="250156" y="596495"/>
+            <a:off x="250156" y="530506"/>
             <a:ext cx="10165404" cy="45719"/>
           </a:xfrm>
           <a:prstGeom prst="rect">
@@ -5143,7 +5289,7 @@
     </p:spTree>
     <p:extLst>
       <p:ext uri="{BB962C8B-B14F-4D97-AF65-F5344CB8AC3E}">
-        <p14:creationId xmlns:p14="http://schemas.microsoft.com/office/powerpoint/2010/main" val="3380845898"/>
+        <p14:creationId xmlns:p14="http://schemas.microsoft.com/office/powerpoint/2010/main" val="1390675152"/>
       </p:ext>
     </p:extLst>
   </p:cSld>
@@ -5175,7 +5321,7 @@
           <p:cNvPr id="3" name="Content Placeholder 2">
             <a:extLst>
               <a:ext uri="{FF2B5EF4-FFF2-40B4-BE49-F238E27FC236}">
-                <a16:creationId xmlns="" xmlns:a16="http://schemas.microsoft.com/office/drawing/2014/main" id="{ABBF52C5-55D5-4510-B050-3D276ACB6EC8}"/>
+                <a16:creationId xmlns:a16="http://schemas.microsoft.com/office/drawing/2014/main" xmlns="" id="{6AB50E12-B186-43F7-BCAD-7B999F82AD6A}"/>
               </a:ext>
             </a:extLst>
           </p:cNvPr>
@@ -5188,8 +5334,8 @@
         </p:nvSpPr>
         <p:spPr>
           <a:xfrm>
-            <a:off x="124178" y="292231"/>
-            <a:ext cx="12067822" cy="6565770"/>
+            <a:off x="94268" y="122548"/>
+            <a:ext cx="12028602" cy="6655324"/>
           </a:xfrm>
         </p:spPr>
         <p:txBody>
@@ -5203,84 +5349,71 @@
             </a:pPr>
             <a:r>
               <a:rPr lang="en-US" sz="2400" b="1" dirty="0"/>
-              <a:t>Challenges</a:t>
-            </a:r>
-          </a:p>
-          <a:p>
-            <a:pPr marL="0" indent="0">
-              <a:buNone/>
-            </a:pPr>
-            <a:endParaRPr lang="en-US" dirty="0"/>
-          </a:p>
-          <a:p>
-            <a:pPr marL="0" indent="0">
-              <a:buNone/>
-            </a:pPr>
-            <a:r>
-              <a:rPr lang="en-US" sz="2200" dirty="0"/>
-              <a:t>While doing this project we face couples of challenges. They are given below</a:t>
-            </a:r>
-          </a:p>
-          <a:p>
-            <a:pPr marL="0" indent="0">
-              <a:buNone/>
-            </a:pPr>
-            <a:endParaRPr lang="en-US" sz="2200" dirty="0"/>
-          </a:p>
-          <a:p>
-            <a:pPr marL="342900" indent="-342900">
-              <a:buFont typeface="+mj-lt"/>
-              <a:buAutoNum type="arabicPeriod"/>
-            </a:pPr>
-            <a:r>
-              <a:rPr lang="en-US" sz="2200" dirty="0"/>
-              <a:t>Limited Resource</a:t>
-            </a:r>
-          </a:p>
-          <a:p>
-            <a:pPr marL="342900" indent="-342900">
-              <a:buFont typeface="+mj-lt"/>
-              <a:buAutoNum type="arabicPeriod"/>
-            </a:pPr>
-            <a:r>
-              <a:rPr lang="en-US" sz="2200" dirty="0" smtClean="0"/>
-              <a:t>Small Dataset</a:t>
-            </a:r>
-            <a:endParaRPr lang="en-US" sz="2200" dirty="0"/>
-          </a:p>
-          <a:p>
-            <a:pPr marL="342900" indent="-342900">
-              <a:buFont typeface="+mj-lt"/>
-              <a:buAutoNum type="arabicPeriod"/>
-            </a:pPr>
-            <a:r>
-              <a:rPr lang="en-US" sz="2200" dirty="0"/>
-              <a:t>Training </a:t>
-            </a:r>
-          </a:p>
-          <a:p>
-            <a:pPr marL="342900" indent="-342900">
-              <a:buFont typeface="+mj-lt"/>
-              <a:buAutoNum type="arabicPeriod"/>
-            </a:pPr>
-            <a:r>
-              <a:rPr lang="en-US" sz="2200" dirty="0"/>
-              <a:t>Parameter </a:t>
-            </a:r>
-            <a:r>
-              <a:rPr lang="en-US" sz="2200" dirty="0" smtClean="0"/>
-              <a:t>tuning</a:t>
-            </a:r>
-            <a:endParaRPr lang="en-US" sz="2200" dirty="0"/>
-          </a:p>
-        </p:txBody>
-      </p:sp>
-      <p:sp>
-        <p:nvSpPr>
-          <p:cNvPr id="5" name="Rectangle 4">
+              <a:t>Architecture For First Approach</a:t>
+            </a:r>
+          </a:p>
+          <a:p>
+            <a:pPr marL="0" indent="0">
+              <a:buNone/>
+            </a:pPr>
+            <a:endParaRPr lang="en-US" sz="2400" b="1" dirty="0"/>
+          </a:p>
+          <a:p>
+            <a:pPr marL="0" indent="0">
+              <a:buNone/>
+            </a:pPr>
+            <a:endParaRPr lang="en-US" sz="2400" b="1" dirty="0"/>
+          </a:p>
+          <a:p>
+            <a:pPr marL="0" indent="0">
+              <a:buNone/>
+            </a:pPr>
+            <a:endParaRPr lang="en-US" sz="2400" b="1" dirty="0"/>
+          </a:p>
+          <a:p>
+            <a:pPr marL="0" indent="0">
+              <a:buNone/>
+            </a:pPr>
+            <a:endParaRPr lang="en-US" sz="2400" b="1" dirty="0"/>
+          </a:p>
+          <a:p>
+            <a:pPr marL="0" indent="0">
+              <a:buNone/>
+            </a:pPr>
+            <a:endParaRPr lang="en-US" sz="2400" b="1" dirty="0"/>
+          </a:p>
+          <a:p>
+            <a:pPr marL="0" indent="0">
+              <a:buNone/>
+            </a:pPr>
+            <a:endParaRPr lang="en-US" sz="2400" b="1" dirty="0"/>
+          </a:p>
+          <a:p>
+            <a:pPr marL="0" indent="0">
+              <a:buNone/>
+            </a:pPr>
+            <a:endParaRPr lang="en-US" sz="2400" b="1" dirty="0"/>
+          </a:p>
+          <a:p>
+            <a:pPr marL="0" indent="0">
+              <a:buNone/>
+            </a:pPr>
+            <a:endParaRPr lang="en-US" sz="2400" b="1" dirty="0"/>
+          </a:p>
+          <a:p>
+            <a:pPr marL="0" indent="0">
+              <a:buNone/>
+            </a:pPr>
+            <a:endParaRPr lang="en-US" sz="2400" b="1" dirty="0"/>
+          </a:p>
+        </p:txBody>
+      </p:sp>
+      <p:sp>
+        <p:nvSpPr>
+          <p:cNvPr id="7" name="Rectangle 6">
             <a:extLst>
               <a:ext uri="{FF2B5EF4-FFF2-40B4-BE49-F238E27FC236}">
-                <a16:creationId xmlns="" xmlns:a16="http://schemas.microsoft.com/office/drawing/2014/main" id="{AD2D1AD9-F87D-4205-B5CB-CF0F299B465E}"/>
+                <a16:creationId xmlns:a16="http://schemas.microsoft.com/office/drawing/2014/main" xmlns="" id="{63B223F2-E837-47E3-9990-86AD3D9C86ED}"/>
               </a:ext>
             </a:extLst>
           </p:cNvPr>
@@ -5289,7 +5422,7 @@
         </p:nvSpPr>
         <p:spPr>
           <a:xfrm>
-            <a:off x="250156" y="803884"/>
+            <a:off x="250156" y="596495"/>
             <a:ext cx="10165404" cy="45719"/>
           </a:xfrm>
           <a:prstGeom prst="rect">
@@ -5324,7 +5457,7 @@
     </p:spTree>
     <p:extLst>
       <p:ext uri="{BB962C8B-B14F-4D97-AF65-F5344CB8AC3E}">
-        <p14:creationId xmlns:p14="http://schemas.microsoft.com/office/powerpoint/2010/main" val="2385867789"/>
+        <p14:creationId xmlns:p14="http://schemas.microsoft.com/office/powerpoint/2010/main" val="3380845898"/>
       </p:ext>
     </p:extLst>
   </p:cSld>

</xml_diff>